<commit_message>
Added screening app to index
</commit_message>
<xml_diff>
--- a/source/images/images.pptx
+++ b/source/images/images.pptx
@@ -34230,10 +34230,10 @@
         </p:nvGrpSpPr>
         <p:grpSpPr>
           <a:xfrm>
-            <a:off x="74946" y="650134"/>
-            <a:ext cx="14547746" cy="3604864"/>
-            <a:chOff x="74946" y="650134"/>
-            <a:chExt cx="14547746" cy="3604864"/>
+            <a:off x="748882" y="191054"/>
+            <a:ext cx="11120775" cy="3604864"/>
+            <a:chOff x="636811" y="650134"/>
+            <a:chExt cx="11120775" cy="3604864"/>
           </a:xfrm>
         </p:grpSpPr>
         <p:sp>
@@ -34318,7 +34318,7 @@
           </p:nvSpPr>
           <p:spPr>
             <a:xfrm>
-              <a:off x="7625092" y="1780308"/>
+              <a:off x="6576384" y="1897458"/>
               <a:ext cx="1645920" cy="265176"/>
             </a:xfrm>
             <a:prstGeom prst="rect">
@@ -34374,74 +34374,6 @@
         </p:sp>
         <p:sp>
           <p:nvSpPr>
-            <p:cNvPr id="6" name="Rectangle 5">
-              <a:extLst>
-                <a:ext uri="{FF2B5EF4-FFF2-40B4-BE49-F238E27FC236}">
-                  <a16:creationId xmlns:a16="http://schemas.microsoft.com/office/drawing/2014/main" id="{759B5DC5-0D5D-4ABD-8719-B6D21142CE41}"/>
-                </a:ext>
-              </a:extLst>
-            </p:cNvPr>
-            <p:cNvSpPr/>
-            <p:nvPr/>
-          </p:nvSpPr>
-          <p:spPr>
-            <a:xfrm>
-              <a:off x="1221904" y="1780309"/>
-              <a:ext cx="1225296" cy="265176"/>
-            </a:xfrm>
-            <a:prstGeom prst="rect">
-              <a:avLst/>
-            </a:prstGeom>
-            <a:solidFill>
-              <a:schemeClr val="bg1">
-                <a:lumMod val="95000"/>
-              </a:schemeClr>
-            </a:solidFill>
-            <a:ln w="12700" cmpd="sng">
-              <a:solidFill>
-                <a:srgbClr val="2C74A5"/>
-              </a:solidFill>
-            </a:ln>
-          </p:spPr>
-          <p:style>
-            <a:lnRef idx="2">
-              <a:schemeClr val="dk1"/>
-            </a:lnRef>
-            <a:fillRef idx="1">
-              <a:schemeClr val="lt1"/>
-            </a:fillRef>
-            <a:effectRef idx="0">
-              <a:schemeClr val="dk1"/>
-            </a:effectRef>
-            <a:fontRef idx="minor">
-              <a:schemeClr val="dk1"/>
-            </a:fontRef>
-          </p:style>
-          <p:txBody>
-            <a:bodyPr tIns="0" bIns="27432" rtlCol="0" anchor="ctr" anchorCtr="1"/>
-            <a:lstStyle/>
-            <a:p>
-              <a:pPr algn="ctr"/>
-              <a:r>
-                <a:rPr lang="es-MX" sz="1200" b="1" dirty="0" err="1">
-                  <a:solidFill>
-                    <a:srgbClr val="2C74A5"/>
-                  </a:solidFill>
-                  <a:latin typeface="Arial Narrow"/>
-                </a:rPr>
-                <a:t>greetings</a:t>
-              </a:r>
-              <a:endParaRPr lang="en-US" sz="1200" b="1" dirty="0">
-                <a:solidFill>
-                  <a:srgbClr val="2C74A5"/>
-                </a:solidFill>
-                <a:latin typeface="Arial Narrow"/>
-              </a:endParaRPr>
-            </a:p>
-          </p:txBody>
-        </p:sp>
-        <p:sp>
-          <p:nvSpPr>
             <p:cNvPr id="7" name="Rectangle 6">
               <a:extLst>
                 <a:ext uri="{FF2B5EF4-FFF2-40B4-BE49-F238E27FC236}">
@@ -34454,7 +34386,7 @@
           </p:nvSpPr>
           <p:spPr>
             <a:xfrm>
-              <a:off x="1141715" y="2937163"/>
+              <a:off x="1670531" y="2937163"/>
               <a:ext cx="548640" cy="265176"/>
             </a:xfrm>
             <a:prstGeom prst="rect">
@@ -34516,7 +34448,7 @@
           </p:nvSpPr>
           <p:spPr>
             <a:xfrm>
-              <a:off x="1969530" y="2937163"/>
+              <a:off x="2498346" y="2937163"/>
               <a:ext cx="457200" cy="265176"/>
             </a:xfrm>
             <a:prstGeom prst="rect">
@@ -34566,53 +34498,6 @@
         </p:sp>
         <p:cxnSp>
           <p:nvCxnSpPr>
-            <p:cNvPr id="10" name="Elbow Connector 133">
-              <a:extLst>
-                <a:ext uri="{FF2B5EF4-FFF2-40B4-BE49-F238E27FC236}">
-                  <a16:creationId xmlns:a16="http://schemas.microsoft.com/office/drawing/2014/main" id="{7840C9F2-19F6-4BA7-95AF-ACDA5B831D82}"/>
-                </a:ext>
-              </a:extLst>
-            </p:cNvPr>
-            <p:cNvCxnSpPr>
-              <a:stCxn id="6" idx="2"/>
-              <a:endCxn id="7" idx="0"/>
-            </p:cNvCxnSpPr>
-            <p:nvPr/>
-          </p:nvCxnSpPr>
-          <p:spPr>
-            <a:xfrm rot="5400000">
-              <a:off x="1179455" y="2282066"/>
-              <a:ext cx="891678" cy="418517"/>
-            </a:xfrm>
-            <a:prstGeom prst="bentConnector3">
-              <a:avLst>
-                <a:gd name="adj1" fmla="val 50000"/>
-              </a:avLst>
-            </a:prstGeom>
-            <a:ln w="9525">
-              <a:solidFill>
-                <a:schemeClr val="accent6"/>
-              </a:solidFill>
-            </a:ln>
-            <a:effectLst/>
-          </p:spPr>
-          <p:style>
-            <a:lnRef idx="2">
-              <a:schemeClr val="accent1"/>
-            </a:lnRef>
-            <a:fillRef idx="0">
-              <a:schemeClr val="accent1"/>
-            </a:fillRef>
-            <a:effectRef idx="1">
-              <a:schemeClr val="accent1"/>
-            </a:effectRef>
-            <a:fontRef idx="minor">
-              <a:schemeClr val="tx1"/>
-            </a:fontRef>
-          </p:style>
-        </p:cxnSp>
-        <p:cxnSp>
-          <p:nvCxnSpPr>
             <p:cNvPr id="11" name="Elbow Connector 135">
               <a:extLst>
                 <a:ext uri="{FF2B5EF4-FFF2-40B4-BE49-F238E27FC236}">
@@ -34621,14 +34506,14 @@
               </a:extLst>
             </p:cNvPr>
             <p:cNvCxnSpPr>
-              <a:stCxn id="6" idx="2"/>
+              <a:cxnSpLocks/>
               <a:endCxn id="8" idx="0"/>
             </p:cNvCxnSpPr>
             <p:nvPr/>
           </p:nvCxnSpPr>
           <p:spPr>
             <a:xfrm rot="16200000" flipH="1">
-              <a:off x="1570502" y="2309535"/>
+              <a:off x="2099318" y="2309535"/>
               <a:ext cx="891678" cy="363578"/>
             </a:xfrm>
             <a:prstGeom prst="bentConnector3">
@@ -34670,14 +34555,14 @@
             <p:cNvCxnSpPr>
               <a:cxnSpLocks/>
               <a:stCxn id="3" idx="2"/>
-              <a:endCxn id="6" idx="0"/>
+              <a:endCxn id="89" idx="0"/>
             </p:cNvCxnSpPr>
             <p:nvPr/>
           </p:nvCxnSpPr>
           <p:spPr>
             <a:xfrm rot="5400000">
-              <a:off x="2837811" y="-76125"/>
-              <a:ext cx="853176" cy="2859693"/>
+              <a:off x="3044221" y="246281"/>
+              <a:ext cx="969173" cy="2330877"/>
             </a:xfrm>
             <a:prstGeom prst="bentConnector3">
               <a:avLst>
@@ -34724,12 +34609,12 @@
           </p:nvCxnSpPr>
           <p:spPr>
             <a:xfrm rot="16200000" flipH="1">
-              <a:off x="6144561" y="-523184"/>
-              <a:ext cx="853175" cy="3753807"/>
+              <a:off x="5561632" y="59745"/>
+              <a:ext cx="970325" cy="2705099"/>
             </a:xfrm>
             <a:prstGeom prst="bentConnector3">
               <a:avLst>
-                <a:gd name="adj1" fmla="val 50000"/>
+                <a:gd name="adj1" fmla="val 48864"/>
               </a:avLst>
             </a:prstGeom>
             <a:ln w="9525">
@@ -34768,7 +34653,7 @@
           </p:nvSpPr>
           <p:spPr>
             <a:xfrm>
-              <a:off x="92152" y="1775798"/>
+              <a:off x="654017" y="1906984"/>
               <a:ext cx="776174" cy="276999"/>
             </a:xfrm>
             <a:prstGeom prst="rect">
@@ -34816,7 +34701,7 @@
           </p:nvSpPr>
           <p:spPr>
             <a:xfrm>
-              <a:off x="96180" y="2946148"/>
+              <a:off x="658045" y="2946148"/>
               <a:ext cx="726482" cy="276999"/>
             </a:xfrm>
             <a:prstGeom prst="rect">
@@ -34864,7 +34749,7 @@
           </p:nvSpPr>
           <p:spPr>
             <a:xfrm>
-              <a:off x="74946" y="3977999"/>
+              <a:off x="636811" y="3977999"/>
               <a:ext cx="1426556" cy="276999"/>
             </a:xfrm>
             <a:prstGeom prst="rect">
@@ -34904,7 +34789,7 @@
           </p:nvSpPr>
           <p:spPr>
             <a:xfrm>
-              <a:off x="2593481" y="2937163"/>
+              <a:off x="3123215" y="2937163"/>
               <a:ext cx="914400" cy="265176"/>
             </a:xfrm>
             <a:prstGeom prst="rect">
@@ -34984,7 +34869,7 @@
           </p:nvSpPr>
           <p:spPr>
             <a:xfrm>
-              <a:off x="3535483" y="2937163"/>
+              <a:off x="3751507" y="3272709"/>
               <a:ext cx="1188720" cy="265176"/>
             </a:xfrm>
             <a:prstGeom prst="rect">
@@ -35120,7 +35005,7 @@
           </p:nvSpPr>
           <p:spPr>
             <a:xfrm>
-              <a:off x="5691425" y="2937163"/>
+              <a:off x="5404983" y="3278685"/>
               <a:ext cx="914400" cy="265176"/>
             </a:xfrm>
             <a:prstGeom prst="rect">
@@ -35188,7 +35073,7 @@
           </p:nvSpPr>
           <p:spPr>
             <a:xfrm>
-              <a:off x="12403957" y="2941469"/>
+              <a:off x="9517308" y="2941469"/>
               <a:ext cx="1097280" cy="259202"/>
             </a:xfrm>
             <a:prstGeom prst="rect">
@@ -35268,7 +35153,7 @@
           </p:nvSpPr>
           <p:spPr>
             <a:xfrm>
-              <a:off x="13525412" y="2937163"/>
+              <a:off x="10660306" y="2937163"/>
               <a:ext cx="1097280" cy="265176"/>
             </a:xfrm>
             <a:prstGeom prst="rect">
@@ -35352,11 +35237,13 @@
           </p:nvCxnSpPr>
           <p:spPr>
             <a:xfrm rot="5400000">
-              <a:off x="6852500" y="1341610"/>
-              <a:ext cx="891679" cy="2299427"/>
+              <a:off x="6072739" y="1952079"/>
+              <a:ext cx="1116051" cy="1537161"/>
             </a:xfrm>
             <a:prstGeom prst="bentConnector3">
-              <a:avLst/>
+              <a:avLst>
+                <a:gd name="adj1" fmla="val 34206"/>
+              </a:avLst>
             </a:prstGeom>
             <a:ln w="9525">
               <a:solidFill>
@@ -35398,8 +35285,8 @@
           </p:nvCxnSpPr>
           <p:spPr>
             <a:xfrm rot="5400000">
-              <a:off x="6383317" y="872427"/>
-              <a:ext cx="891679" cy="3237792"/>
+              <a:off x="5917538" y="1455356"/>
+              <a:ext cx="774529" cy="2189084"/>
             </a:xfrm>
             <a:prstGeom prst="bentConnector3">
               <a:avLst/>
@@ -35444,11 +35331,13 @@
           </p:nvCxnSpPr>
           <p:spPr>
             <a:xfrm rot="5400000">
-              <a:off x="5843109" y="332219"/>
-              <a:ext cx="891679" cy="4318209"/>
+              <a:off x="5317569" y="1190933"/>
+              <a:ext cx="1110075" cy="3053477"/>
             </a:xfrm>
             <a:prstGeom prst="bentConnector3">
-              <a:avLst/>
+              <a:avLst>
+                <a:gd name="adj1" fmla="val 36106"/>
+              </a:avLst>
             </a:prstGeom>
             <a:ln w="9525">
               <a:solidFill>
@@ -35490,8 +35379,8 @@
           </p:nvCxnSpPr>
           <p:spPr>
             <a:xfrm rot="5400000">
-              <a:off x="5303528" y="-207362"/>
-              <a:ext cx="891679" cy="5397371"/>
+              <a:off x="5102616" y="640434"/>
+              <a:ext cx="774529" cy="3818929"/>
             </a:xfrm>
             <a:prstGeom prst="bentConnector3">
               <a:avLst/>
@@ -35536,8 +35425,8 @@
           </p:nvCxnSpPr>
           <p:spPr>
             <a:xfrm rot="16200000" flipH="1">
-              <a:off x="10252332" y="241203"/>
-              <a:ext cx="895985" cy="4504545"/>
+              <a:off x="8343229" y="1218749"/>
+              <a:ext cx="778835" cy="2666604"/>
             </a:xfrm>
             <a:prstGeom prst="bentConnector3">
               <a:avLst/>
@@ -35582,8 +35471,8 @@
           </p:nvCxnSpPr>
           <p:spPr>
             <a:xfrm rot="16200000" flipH="1">
-              <a:off x="10815213" y="-321677"/>
-              <a:ext cx="891679" cy="5626000"/>
+              <a:off x="8916881" y="645097"/>
+              <a:ext cx="774529" cy="3809602"/>
             </a:xfrm>
             <a:prstGeom prst="bentConnector3">
               <a:avLst/>
@@ -35692,7 +35581,7 @@
           </p:nvSpPr>
           <p:spPr>
             <a:xfrm>
-              <a:off x="11553395" y="3971977"/>
+              <a:off x="8801225" y="3969047"/>
               <a:ext cx="1005840" cy="265176"/>
             </a:xfrm>
             <a:prstGeom prst="rect">
@@ -35760,7 +35649,7 @@
           </p:nvSpPr>
           <p:spPr>
             <a:xfrm>
-              <a:off x="13060175" y="3966892"/>
+              <a:off x="9953409" y="3966892"/>
               <a:ext cx="996696" cy="265176"/>
             </a:xfrm>
             <a:prstGeom prst="rect">
@@ -35824,9 +35713,9 @@
             <p:nvPr/>
           </p:nvCxnSpPr>
           <p:spPr>
-            <a:xfrm rot="16200000" flipH="1">
-              <a:off x="2665862" y="3587157"/>
-              <a:ext cx="769638" cy="1"/>
+            <a:xfrm rot="5400000">
+              <a:off x="2930730" y="3322292"/>
+              <a:ext cx="769638" cy="529733"/>
             </a:xfrm>
             <a:prstGeom prst="bentConnector3">
               <a:avLst/>
@@ -35871,8 +35760,8 @@
           </p:nvCxnSpPr>
           <p:spPr>
             <a:xfrm rot="5400000">
-              <a:off x="12118803" y="3138183"/>
-              <a:ext cx="771306" cy="896282"/>
+              <a:off x="9300859" y="3203958"/>
+              <a:ext cx="768376" cy="761803"/>
             </a:xfrm>
             <a:prstGeom prst="bentConnector3">
               <a:avLst>
@@ -35919,8 +35808,8 @@
           </p:nvCxnSpPr>
           <p:spPr>
             <a:xfrm rot="16200000" flipH="1">
-              <a:off x="12872450" y="3280818"/>
-              <a:ext cx="766221" cy="605926"/>
+              <a:off x="9875742" y="3390876"/>
+              <a:ext cx="766221" cy="385809"/>
             </a:xfrm>
             <a:prstGeom prst="bentConnector3">
               <a:avLst>
@@ -35963,7 +35852,7 @@
           </p:nvSpPr>
           <p:spPr>
             <a:xfrm>
-              <a:off x="3809804" y="3966892"/>
+              <a:off x="4022674" y="3966892"/>
               <a:ext cx="640080" cy="265176"/>
             </a:xfrm>
             <a:prstGeom prst="rect">
@@ -36027,9 +35916,9 @@
             <p:nvPr/>
           </p:nvCxnSpPr>
           <p:spPr>
-            <a:xfrm rot="16200000" flipH="1">
-              <a:off x="3747567" y="3584614"/>
-              <a:ext cx="764553" cy="1"/>
+            <a:xfrm rot="5400000">
+              <a:off x="4129788" y="3750812"/>
+              <a:ext cx="429007" cy="3153"/>
             </a:xfrm>
             <a:prstGeom prst="bentConnector3">
               <a:avLst/>
@@ -36070,7 +35959,7 @@
           </p:nvSpPr>
           <p:spPr>
             <a:xfrm>
-              <a:off x="96180" y="650134"/>
+              <a:off x="658045" y="650134"/>
               <a:ext cx="474810" cy="276999"/>
             </a:xfrm>
             <a:prstGeom prst="rect">
@@ -36112,7 +36001,7 @@
           </p:nvSpPr>
           <p:spPr>
             <a:xfrm>
-              <a:off x="6632233" y="2936717"/>
+              <a:off x="5993258" y="2936717"/>
               <a:ext cx="1645920" cy="265176"/>
             </a:xfrm>
             <a:prstGeom prst="rect">
@@ -36180,7 +36069,7 @@
           </p:nvSpPr>
           <p:spPr>
             <a:xfrm>
-              <a:off x="8304202" y="2937432"/>
+              <a:off x="7052306" y="3278685"/>
               <a:ext cx="1371600" cy="263237"/>
             </a:xfrm>
             <a:prstGeom prst="rect">
@@ -36248,7 +36137,7 @@
           </p:nvSpPr>
           <p:spPr>
             <a:xfrm>
-              <a:off x="9704235" y="2937433"/>
+              <a:off x="7853398" y="2937433"/>
               <a:ext cx="1280160" cy="265176"/>
             </a:xfrm>
             <a:prstGeom prst="rect">
@@ -36316,7 +36205,7 @@
           </p:nvSpPr>
           <p:spPr>
             <a:xfrm>
-              <a:off x="11011982" y="2941469"/>
+              <a:off x="8585212" y="3278685"/>
               <a:ext cx="1371600" cy="259200"/>
             </a:xfrm>
             <a:prstGeom prst="rect">
@@ -36387,7 +36276,7 @@
           </p:nvCxnSpPr>
           <p:spPr>
             <a:xfrm rot="5400000">
-              <a:off x="13314686" y="2819875"/>
+              <a:off x="10449580" y="2819875"/>
               <a:ext cx="376903" cy="1141830"/>
             </a:xfrm>
             <a:prstGeom prst="bentConnector2">
@@ -36433,8 +36322,8 @@
           </p:nvCxnSpPr>
           <p:spPr>
             <a:xfrm rot="5400000">
-              <a:off x="7506007" y="1994671"/>
-              <a:ext cx="891233" cy="992859"/>
+              <a:off x="6720740" y="2258112"/>
+              <a:ext cx="774083" cy="583126"/>
             </a:xfrm>
             <a:prstGeom prst="bentConnector3">
               <a:avLst>
@@ -36481,8 +36370,8 @@
           </p:nvCxnSpPr>
           <p:spPr>
             <a:xfrm rot="16200000" flipH="1">
-              <a:off x="8273053" y="2220483"/>
-              <a:ext cx="891948" cy="541950"/>
+              <a:off x="7010700" y="2551278"/>
+              <a:ext cx="1116051" cy="338762"/>
             </a:xfrm>
             <a:prstGeom prst="bentConnector3">
               <a:avLst>
@@ -36529,8 +36418,8 @@
           </p:nvCxnSpPr>
           <p:spPr>
             <a:xfrm rot="16200000" flipH="1">
-              <a:off x="8950209" y="1543326"/>
-              <a:ext cx="891949" cy="1896263"/>
+              <a:off x="7559012" y="2002966"/>
+              <a:ext cx="774799" cy="1094134"/>
             </a:xfrm>
             <a:prstGeom prst="bentConnector3">
               <a:avLst>
@@ -36570,15 +36459,127 @@
             </p:cNvPr>
             <p:cNvCxnSpPr>
               <a:cxnSpLocks/>
-              <a:stCxn id="5" idx="2"/>
-              <a:endCxn id="69" idx="0"/>
             </p:cNvCxnSpPr>
             <p:nvPr/>
           </p:nvCxnSpPr>
           <p:spPr>
             <a:xfrm rot="16200000" flipH="1">
-              <a:off x="9624925" y="868611"/>
-              <a:ext cx="895985" cy="3249730"/>
+              <a:off x="7777154" y="1784826"/>
+              <a:ext cx="1116051" cy="1871668"/>
+            </a:xfrm>
+            <a:prstGeom prst="bentConnector3">
+              <a:avLst>
+                <a:gd name="adj1" fmla="val 35193"/>
+              </a:avLst>
+            </a:prstGeom>
+            <a:ln w="9525">
+              <a:solidFill>
+                <a:schemeClr val="accent6"/>
+              </a:solidFill>
+            </a:ln>
+            <a:effectLst/>
+          </p:spPr>
+          <p:style>
+            <a:lnRef idx="2">
+              <a:schemeClr val="accent1"/>
+            </a:lnRef>
+            <a:fillRef idx="0">
+              <a:schemeClr val="accent1"/>
+            </a:fillRef>
+            <a:effectRef idx="1">
+              <a:schemeClr val="accent1"/>
+            </a:effectRef>
+            <a:fontRef idx="minor">
+              <a:schemeClr val="tx1"/>
+            </a:fontRef>
+          </p:style>
+        </p:cxnSp>
+        <p:sp>
+          <p:nvSpPr>
+            <p:cNvPr id="89" name="Rectangle 88">
+              <a:extLst>
+                <a:ext uri="{FF2B5EF4-FFF2-40B4-BE49-F238E27FC236}">
+                  <a16:creationId xmlns:a16="http://schemas.microsoft.com/office/drawing/2014/main" id="{8F0E2DB5-1C2B-4E6A-AC33-B2073FA001F6}"/>
+                </a:ext>
+              </a:extLst>
+            </p:cNvPr>
+            <p:cNvSpPr/>
+            <p:nvPr/>
+          </p:nvSpPr>
+          <p:spPr>
+            <a:xfrm>
+              <a:off x="1750720" y="1896306"/>
+              <a:ext cx="1225296" cy="265176"/>
+            </a:xfrm>
+            <a:prstGeom prst="rect">
+              <a:avLst/>
+            </a:prstGeom>
+            <a:solidFill>
+              <a:schemeClr val="bg1">
+                <a:lumMod val="95000"/>
+              </a:schemeClr>
+            </a:solidFill>
+            <a:ln w="12700" cmpd="sng">
+              <a:solidFill>
+                <a:srgbClr val="2C74A5"/>
+              </a:solidFill>
+            </a:ln>
+          </p:spPr>
+          <p:style>
+            <a:lnRef idx="2">
+              <a:schemeClr val="dk1"/>
+            </a:lnRef>
+            <a:fillRef idx="1">
+              <a:schemeClr val="lt1"/>
+            </a:fillRef>
+            <a:effectRef idx="0">
+              <a:schemeClr val="dk1"/>
+            </a:effectRef>
+            <a:fontRef idx="minor">
+              <a:schemeClr val="dk1"/>
+            </a:fontRef>
+          </p:style>
+          <p:txBody>
+            <a:bodyPr tIns="0" bIns="27432" rtlCol="0" anchor="ctr" anchorCtr="1"/>
+            <a:lstStyle/>
+            <a:p>
+              <a:pPr algn="ctr"/>
+              <a:r>
+                <a:rPr lang="es-MX" sz="1200" b="1" dirty="0" err="1">
+                  <a:solidFill>
+                    <a:srgbClr val="2C74A5"/>
+                  </a:solidFill>
+                  <a:latin typeface="Arial Narrow"/>
+                </a:rPr>
+                <a:t>greetings</a:t>
+              </a:r>
+              <a:endParaRPr lang="en-US" sz="1200" b="1" dirty="0">
+                <a:solidFill>
+                  <a:srgbClr val="2C74A5"/>
+                </a:solidFill>
+                <a:latin typeface="Arial Narrow"/>
+              </a:endParaRPr>
+            </a:p>
+          </p:txBody>
+        </p:sp>
+        <p:cxnSp>
+          <p:nvCxnSpPr>
+            <p:cNvPr id="90" name="Elbow Connector 133">
+              <a:extLst>
+                <a:ext uri="{FF2B5EF4-FFF2-40B4-BE49-F238E27FC236}">
+                  <a16:creationId xmlns:a16="http://schemas.microsoft.com/office/drawing/2014/main" id="{021FD4EE-524E-4060-8A41-4335A1AD3CDA}"/>
+                </a:ext>
+              </a:extLst>
+            </p:cNvPr>
+            <p:cNvCxnSpPr>
+              <a:cxnSpLocks/>
+            </p:cNvCxnSpPr>
+            <p:nvPr/>
+          </p:nvCxnSpPr>
+          <p:spPr>
+            <a:xfrm rot="5400000">
+              <a:off x="1708271" y="2282069"/>
+              <a:ext cx="891678" cy="418517"/>
             </a:xfrm>
             <a:prstGeom prst="bentConnector3">
               <a:avLst>

</xml_diff>